<commit_message>
add ref to github repo in presentation
</commit_message>
<xml_diff>
--- a/SparkR.pptx
+++ b/SparkR.pptx
@@ -3611,7 +3611,17 @@
               <a:rPr lang="en-US" sz="2100" dirty="0"/>
               <a:t>April 2015</a:t>
             </a:r>
+          </a:p>
+          <a:p>
+            <a:pPr algn="l"/>
             <a:endParaRPr lang="en-US" sz="2100" dirty="0"/>
+          </a:p>
+          <a:p>
+            <a:pPr algn="l"/>
+            <a:r>
+              <a:rPr lang="en-US" sz="2100" dirty="0"/>
+              <a:t>https://github.com/markmo/sparkr-meetup-sparkr-demo</a:t>
+            </a:r>
           </a:p>
         </p:txBody>
       </p:sp>

</xml_diff>